<commit_message>
Unit 1 Update for Modern Electronics
</commit_message>
<xml_diff>
--- a/High School/Modern Electricity and Electronics/Unit 1 - Introduction, Safety & Design Process/Section 3 - Safety/Assets/Unit 1 - Section 3 - Safety.pptx
+++ b/High School/Modern Electricity and Electronics/Unit 1 - Introduction, Safety & Design Process/Section 3 - Safety/Assets/Unit 1 - Section 3 - Safety.pptx
@@ -226,7 +226,7 @@
           <a:p>
             <a:fld id="{6AC4FB8F-ED15-48AB-97BD-17129D4E699D}" type="datetimeFigureOut">
               <a:rPr lang="en-US" smtClean="0"/>
-              <a:t>9/13/2018</a:t>
+              <a:t>9/14/2018</a:t>
             </a:fld>
             <a:endParaRPr lang="en-US" dirty="0"/>
           </a:p>
@@ -391,7 +391,7 @@
           <a:p>
             <a:fld id="{BBC9D437-CD83-4825-AD0D-5E7B341BC79B}" type="datetimeFigureOut">
               <a:rPr lang="en-US" smtClean="0"/>
-              <a:t>9/13/2018</a:t>
+              <a:t>9/14/2018</a:t>
             </a:fld>
             <a:endParaRPr lang="en-US" dirty="0"/>
           </a:p>
@@ -817,7 +817,7 @@
           <a:p>
             <a:fld id="{85AB7CBB-843F-464A-A764-71D6ADC27CFA}" type="datetime1">
               <a:rPr lang="en-US" smtClean="0"/>
-              <a:t>9/13/2018</a:t>
+              <a:t>9/14/2018</a:t>
             </a:fld>
             <a:endParaRPr lang="en-US" dirty="0"/>
           </a:p>
@@ -1002,7 +1002,7 @@
           <a:p>
             <a:fld id="{CBEFC03D-3A1F-4813-9337-02411FCC3A9A}" type="datetime1">
               <a:rPr lang="en-US" smtClean="0"/>
-              <a:t>9/13/2018</a:t>
+              <a:t>9/14/2018</a:t>
             </a:fld>
             <a:endParaRPr lang="en-US" dirty="0"/>
           </a:p>
@@ -1200,7 +1200,7 @@
           <a:p>
             <a:fld id="{3D638F79-DFA0-4C26-9553-23A017B69AB6}" type="datetime1">
               <a:rPr lang="en-US" smtClean="0"/>
-              <a:t>9/13/2018</a:t>
+              <a:t>9/14/2018</a:t>
             </a:fld>
             <a:endParaRPr lang="en-US" dirty="0"/>
           </a:p>
@@ -1394,7 +1394,7 @@
           <a:p>
             <a:fld id="{A70B34E7-E1D9-4FBF-A1A0-4009669A00BF}" type="datetime1">
               <a:rPr lang="en-US" smtClean="0"/>
-              <a:t>9/13/2018</a:t>
+              <a:t>9/14/2018</a:t>
             </a:fld>
             <a:endParaRPr lang="en-US" dirty="0"/>
           </a:p>
@@ -1883,7 +1883,7 @@
           <a:p>
             <a:fld id="{7579E8B6-2F47-420B-83EA-EB2285D13EC9}" type="datetime1">
               <a:rPr lang="en-US" smtClean="0"/>
-              <a:t>9/13/2018</a:t>
+              <a:t>9/14/2018</a:t>
             </a:fld>
             <a:endParaRPr lang="en-US" dirty="0"/>
           </a:p>
@@ -2321,7 +2321,7 @@
           <a:p>
             <a:fld id="{2304803D-B10E-4B90-8456-A0E05393E233}" type="datetime1">
               <a:rPr lang="en-US" smtClean="0"/>
-              <a:t>9/13/2018</a:t>
+              <a:t>9/14/2018</a:t>
             </a:fld>
             <a:endParaRPr lang="en-US" dirty="0"/>
           </a:p>
@@ -2454,7 +2454,7 @@
           <a:p>
             <a:fld id="{CCE1E62F-6CCE-4064-96C2-2084AF883904}" type="datetime1">
               <a:rPr lang="en-US" smtClean="0"/>
-              <a:t>9/13/2018</a:t>
+              <a:t>9/14/2018</a:t>
             </a:fld>
             <a:endParaRPr lang="en-US" dirty="0"/>
           </a:p>
@@ -2564,7 +2564,7 @@
           <a:p>
             <a:fld id="{AA615CA6-EC4D-4728-8AA6-534BE7E9B67C}" type="datetime1">
               <a:rPr lang="en-US" smtClean="0"/>
-              <a:t>9/13/2018</a:t>
+              <a:t>9/14/2018</a:t>
             </a:fld>
             <a:endParaRPr lang="en-US" dirty="0"/>
           </a:p>
@@ -2878,7 +2878,7 @@
           <a:p>
             <a:fld id="{A6139942-0A2E-443A-842F-D6DE74360370}" type="datetime1">
               <a:rPr lang="en-US" smtClean="0"/>
-              <a:t>9/13/2018</a:t>
+              <a:t>9/14/2018</a:t>
             </a:fld>
             <a:endParaRPr lang="en-US" dirty="0"/>
           </a:p>
@@ -3395,7 +3395,7 @@
           <a:p>
             <a:fld id="{3F138946-C5C1-4A11-BA69-F12F43F8A94B}" type="datetime1">
               <a:rPr lang="en-US" smtClean="0"/>
-              <a:t>9/13/2018</a:t>
+              <a:t>9/14/2018</a:t>
             </a:fld>
             <a:endParaRPr lang="en-US" dirty="0"/>
           </a:p>

</xml_diff>